<commit_message>
FrontEnd - fixed error with matchMsg()
</commit_message>
<xml_diff>
--- a/android tutorials/Project/FriendFinder 1.0/friendFinder.pptx
+++ b/android tutorials/Project/FriendFinder 1.0/friendFinder.pptx
@@ -5794,7 +5794,7 @@
         <p:spPr>
           <a:xfrm>
             <a:off x="564942" y="1719810"/>
-            <a:ext cx="10522432" cy="4031873"/>
+            <a:ext cx="8634095" cy="3785652"/>
           </a:xfrm>
           <a:prstGeom prst="rect">
             <a:avLst/>
@@ -5809,6 +5809,21 @@
           <a:p>
             <a:pPr marL="342900" indent="-342900" defTabSz="914400"/>
             <a:r>
+              <a:rPr lang="en-US" sz="2400" dirty="0" smtClean="0"/>
+              <a:t>Download </a:t>
+            </a:r>
+            <a:r>
+              <a:rPr lang="en-US" sz="2400" dirty="0" err="1" smtClean="0"/>
+              <a:t>docker</a:t>
+            </a:r>
+            <a:r>
+              <a:rPr lang="en-US" sz="2400" dirty="0" smtClean="0"/>
+              <a:t> for mac.</a:t>
+            </a:r>
+          </a:p>
+          <a:p>
+            <a:pPr marL="342900" indent="-342900" defTabSz="914400"/>
+            <a:r>
               <a:rPr lang="en-US" sz="2400" u="sng" dirty="0" smtClean="0"/>
               <a:t>Build a </a:t>
             </a:r>
@@ -5845,8 +5860,21 @@
             </a:r>
             <a:r>
               <a:rPr lang="en-US" sz="2400" dirty="0" smtClean="0"/>
-              <a:t> in one directory): </a:t>
-            </a:r>
+              <a:t> in one </a:t>
+            </a:r>
+            <a:r>
+              <a:rPr lang="en-US" sz="2400" dirty="0" smtClean="0"/>
+              <a:t>directory, e.g.:</a:t>
+            </a:r>
+            <a:r>
+              <a:rPr lang="en-US" sz="2400" dirty="0" err="1" smtClean="0"/>
+              <a:t>RunMe</a:t>
+            </a:r>
+            <a:r>
+              <a:rPr lang="en-US" sz="2400" dirty="0" smtClean="0"/>
+              <a:t>): </a:t>
+            </a:r>
+            <a:endParaRPr lang="en-US" sz="2400" dirty="0" smtClean="0"/>
           </a:p>
           <a:p>
             <a:pPr marL="342900" indent="-342900" defTabSz="914400"/>
@@ -5902,15 +5930,7 @@
             </a:r>
             <a:r>
               <a:rPr lang="en-CA" sz="2400" u="sng" dirty="0" smtClean="0"/>
-              <a:t> </a:t>
-            </a:r>
-            <a:r>
-              <a:rPr lang="en-CA" sz="2400" u="sng" dirty="0" smtClean="0"/>
-              <a:t>change </a:t>
-            </a:r>
-            <a:r>
-              <a:rPr lang="en-CA" sz="2400" u="sng" dirty="0" smtClean="0"/>
-              <a:t>the line under volumes</a:t>
+              <a:t> change the line under volumes</a:t>
             </a:r>
           </a:p>
           <a:p>
@@ -5920,59 +5940,19 @@
               <a:t>volumes:</a:t>
             </a:r>
             <a:r>
-              <a:rPr lang="en-CA" sz="2400" b="1" dirty="0"/>
+              <a:rPr lang="en-CA" sz="2400" b="1"/>
               <a:t/>
             </a:r>
             <a:br>
-              <a:rPr lang="en-CA" sz="2400" b="1" dirty="0"/>
+              <a:rPr lang="en-CA" sz="2400" b="1"/>
             </a:br>
             <a:r>
-              <a:rPr lang="en-CA" sz="1600" b="1" dirty="0"/>
-              <a:t>  </a:t>
-            </a:r>
-            <a:r>
-              <a:rPr lang="en-CA" sz="1600" dirty="0"/>
-              <a:t>- /Users/grace/Documents/Android\ for\ </a:t>
-            </a:r>
-            <a:r>
-              <a:rPr lang="en-CA" sz="1600" dirty="0" err="1" smtClean="0"/>
-              <a:t>Javaprogrammers</a:t>
-            </a:r>
-            <a:r>
-              <a:rPr lang="en-CA" sz="1600" dirty="0" smtClean="0"/>
-              <a:t>/Project/</a:t>
-            </a:r>
-            <a:r>
-              <a:rPr lang="en-CA" sz="1600" dirty="0" err="1" smtClean="0"/>
-              <a:t>mysql_persistent</a:t>
-            </a:r>
-            <a:r>
-              <a:rPr lang="en-CA" sz="1600" dirty="0"/>
-              <a:t>:/</a:t>
-            </a:r>
-            <a:r>
-              <a:rPr lang="en-CA" sz="1600" dirty="0" err="1" smtClean="0"/>
-              <a:t>var</a:t>
-            </a:r>
-            <a:r>
-              <a:rPr lang="en-CA" sz="1600" dirty="0" smtClean="0"/>
-              <a:t>/lib/</a:t>
-            </a:r>
-            <a:r>
-              <a:rPr lang="en-CA" sz="1600" dirty="0" err="1" smtClean="0"/>
-              <a:t>mysql</a:t>
-            </a:r>
-            <a:endParaRPr lang="en-CA" sz="1600" dirty="0" smtClean="0"/>
-          </a:p>
-          <a:p>
-            <a:pPr marL="342900" indent="-342900" defTabSz="914400"/>
-            <a:endParaRPr lang="en-CA" sz="2400" dirty="0" smtClean="0"/>
-          </a:p>
-          <a:p>
-            <a:pPr marL="342900" indent="-342900" defTabSz="914400"/>
+              <a:rPr lang="en-CA" sz="2400" smtClean="0"/>
+              <a:t>To </a:t>
+            </a:r>
             <a:r>
               <a:rPr lang="en-CA" sz="2400" dirty="0" smtClean="0"/>
-              <a:t>To your path, wherever in your the system: </a:t>
+              <a:t>your path, wherever in your the system, e.g.: </a:t>
             </a:r>
           </a:p>
           <a:p>
@@ -5987,11 +5967,11 @@
             </a:r>
             <a:r>
               <a:rPr lang="en-CA" sz="2400" dirty="0" smtClean="0"/>
-              <a:t>/&lt;your user&gt;</a:t>
-            </a:r>
-            <a:r>
-              <a:rPr lang="en-CA" sz="2400" dirty="0"/>
-              <a:t>:/</a:t>
+              <a:t>/&lt;your user</a:t>
+            </a:r>
+            <a:r>
+              <a:rPr lang="en-CA" sz="2400" dirty="0" smtClean="0"/>
+              <a:t>&gt;/&lt;path&gt;:/</a:t>
             </a:r>
             <a:r>
               <a:rPr lang="en-CA" sz="2400" dirty="0" err="1" smtClean="0"/>
@@ -6076,7 +6056,7 @@
         <p:spPr>
           <a:xfrm>
             <a:off x="564942" y="1719810"/>
-            <a:ext cx="9501319" cy="1200329"/>
+            <a:ext cx="10309232" cy="1569660"/>
           </a:xfrm>
           <a:prstGeom prst="rect">
             <a:avLst/>
@@ -6106,12 +6086,20 @@
           <a:p>
             <a:pPr marL="342900" indent="-342900" defTabSz="914400"/>
             <a:r>
-              <a:rPr lang="en-CA" sz="2400" dirty="0" err="1"/>
+              <a:rPr lang="en-CA" sz="2400" dirty="0" smtClean="0"/>
+              <a:t>&gt; </a:t>
+            </a:r>
+            <a:r>
+              <a:rPr lang="en-CA" sz="2400" dirty="0" err="1" smtClean="0"/>
               <a:t>docker</a:t>
             </a:r>
             <a:r>
+              <a:rPr lang="en-CA" sz="2400" dirty="0" smtClean="0"/>
+              <a:t>-compose </a:t>
+            </a:r>
+            <a:r>
               <a:rPr lang="en-CA" sz="2400" dirty="0"/>
-              <a:t>-compose -f </a:t>
+              <a:t>-f </a:t>
             </a:r>
             <a:r>
               <a:rPr lang="en-CA" sz="2400" dirty="0" smtClean="0"/>
@@ -6138,11 +6126,34 @@
             </a:r>
             <a:r>
               <a:rPr lang="en-CA" sz="2400" dirty="0"/>
-              <a:t>up -</a:t>
+              <a:t>up </a:t>
             </a:r>
             <a:r>
               <a:rPr lang="en-CA" sz="2400" dirty="0" smtClean="0"/>
-              <a:t>d</a:t>
+              <a:t>–d</a:t>
+            </a:r>
+          </a:p>
+          <a:p>
+            <a:pPr marL="342900" indent="-342900" defTabSz="914400"/>
+            <a:r>
+              <a:rPr lang="en-CA" sz="2400" dirty="0" smtClean="0"/>
+              <a:t>This hopefully started the </a:t>
+            </a:r>
+            <a:r>
+              <a:rPr lang="en-CA" sz="2400" dirty="0" err="1" smtClean="0"/>
+              <a:t>mysql</a:t>
+            </a:r>
+            <a:r>
+              <a:rPr lang="en-CA" sz="2400" dirty="0" smtClean="0"/>
+              <a:t> and java app in a </a:t>
+            </a:r>
+            <a:r>
+              <a:rPr lang="en-CA" sz="2400" dirty="0" err="1" smtClean="0"/>
+              <a:t>docker</a:t>
+            </a:r>
+            <a:r>
+              <a:rPr lang="en-CA" sz="2400" dirty="0" smtClean="0"/>
+              <a:t> container. </a:t>
             </a:r>
             <a:endParaRPr lang="en-CA" sz="2400" dirty="0"/>
           </a:p>
@@ -6156,7 +6167,7 @@
         </p:nvSpPr>
         <p:spPr>
           <a:xfrm>
-            <a:off x="564942" y="3226877"/>
+            <a:off x="564942" y="3473062"/>
             <a:ext cx="11219738" cy="3046988"/>
           </a:xfrm>
           <a:prstGeom prst="rect">
@@ -6192,15 +6203,7 @@
             </a:r>
             <a:r>
               <a:rPr lang="en-US" sz="2400" dirty="0" smtClean="0"/>
-              <a:t> then </a:t>
-            </a:r>
-            <a:r>
-              <a:rPr lang="en-US" sz="2400" dirty="0" smtClean="0"/>
-              <a:t>run as </a:t>
-            </a:r>
-            <a:r>
-              <a:rPr lang="en-US" sz="2400" dirty="0" smtClean="0"/>
-              <a:t>a native Spring app: </a:t>
+              <a:t> then run as a native Spring app: </a:t>
             </a:r>
           </a:p>
           <a:p>
@@ -6245,11 +6248,7 @@
             </a:r>
             <a:r>
               <a:rPr lang="en-CA" dirty="0" smtClean="0"/>
-              <a:t>MYSQL_ALLOW_EMPTY_PASSWORD=yes </a:t>
-            </a:r>
-            <a:r>
-              <a:rPr lang="en-CA" dirty="0" smtClean="0"/>
-              <a:t>-</a:t>
+              <a:t>MYSQL_ALLOW_EMPTY_PASSWORD=yes -</a:t>
             </a:r>
             <a:r>
               <a:rPr lang="en-CA" dirty="0"/>
@@ -6291,33 +6290,13 @@
             </a:r>
             <a:r>
               <a:rPr lang="en-US" sz="2400" dirty="0" smtClean="0"/>
-              <a:t> </a:t>
-            </a:r>
-            <a:r>
-              <a:rPr lang="en-US" sz="2400" dirty="0" smtClean="0"/>
-              <a:t>folder of the Java </a:t>
-            </a:r>
-          </a:p>
-          <a:p>
-            <a:r>
-              <a:rPr lang="en-US" sz="2400" dirty="0" smtClean="0"/>
-              <a:t>Spring server</a:t>
-            </a:r>
-            <a:r>
-              <a:rPr lang="en-US" sz="2400" dirty="0" smtClean="0"/>
-              <a:t> </a:t>
-            </a:r>
-            <a:r>
-              <a:rPr lang="en-US" sz="2400" dirty="0" smtClean="0"/>
-              <a:t>are in the </a:t>
-            </a:r>
-            <a:r>
-              <a:rPr lang="en-US" sz="2400" dirty="0" smtClean="0"/>
-              <a:t>same </a:t>
-            </a:r>
-            <a:r>
-              <a:rPr lang="en-US" sz="2400" dirty="0" smtClean="0"/>
-              <a:t>directory. </a:t>
+              <a:t> folder of the Java </a:t>
+            </a:r>
+          </a:p>
+          <a:p>
+            <a:r>
+              <a:rPr lang="en-US" sz="2400" dirty="0" smtClean="0"/>
+              <a:t>Spring server are in the same directory. </a:t>
             </a:r>
             <a:endParaRPr lang="en-US" sz="2400" dirty="0"/>
           </a:p>
@@ -6354,11 +6333,7 @@
             </a:r>
             <a:r>
               <a:rPr lang="en-US" sz="2400" dirty="0" smtClean="0"/>
-              <a:t> </a:t>
-            </a:r>
-            <a:r>
-              <a:rPr lang="en-US" sz="2400" dirty="0" smtClean="0"/>
-              <a:t>class </a:t>
+              <a:t> class </a:t>
             </a:r>
             <a:endParaRPr lang="en-US" sz="2400" dirty="0"/>
           </a:p>
@@ -6446,25 +6421,13 @@
           <a:p>
             <a:r>
               <a:rPr lang="en-US" sz="2400" dirty="0" smtClean="0"/>
-              <a:t>To add </a:t>
-            </a:r>
-            <a:r>
-              <a:rPr lang="en-US" sz="2400" dirty="0" smtClean="0"/>
-              <a:t>users, </a:t>
-            </a:r>
-            <a:r>
-              <a:rPr lang="en-US" sz="2400" dirty="0" smtClean="0"/>
-              <a:t>in terminal type: </a:t>
-            </a:r>
-          </a:p>
-          <a:p>
-            <a:r>
-              <a:rPr lang="en-US" sz="2400" dirty="0" smtClean="0"/>
-              <a:t>&gt; </a:t>
-            </a:r>
-            <a:r>
-              <a:rPr lang="en-US" sz="2400" dirty="0" smtClean="0"/>
-              <a:t>bash </a:t>
+              <a:t>To add users, in terminal type: </a:t>
+            </a:r>
+          </a:p>
+          <a:p>
+            <a:r>
+              <a:rPr lang="en-US" sz="2400" dirty="0" smtClean="0"/>
+              <a:t>&gt; bash </a:t>
             </a:r>
             <a:r>
               <a:rPr lang="en-US" sz="2400" dirty="0" err="1" smtClean="0"/>
@@ -6922,23 +6885,7 @@
             </a:r>
             <a:r>
               <a:rPr lang="en-US" sz="2400" dirty="0" smtClean="0"/>
-              <a:t> is an application where </a:t>
-            </a:r>
-            <a:r>
-              <a:rPr lang="en-US" sz="2400" dirty="0" smtClean="0"/>
-              <a:t>the user can </a:t>
-            </a:r>
-            <a:r>
-              <a:rPr lang="en-US" sz="2400" dirty="0" smtClean="0"/>
-              <a:t>find </a:t>
-            </a:r>
-            <a:r>
-              <a:rPr lang="en-US" sz="2400" dirty="0" smtClean="0"/>
-              <a:t>its friends</a:t>
-            </a:r>
-            <a:r>
-              <a:rPr lang="en-US" sz="2400" dirty="0" smtClean="0"/>
-              <a:t>. </a:t>
+              <a:t> is an application where the user can find its friends. </a:t>
             </a:r>
           </a:p>
         </p:txBody>
@@ -7060,11 +7007,7 @@
           <a:p>
             <a:r>
               <a:rPr lang="en-US" sz="2400" dirty="0" smtClean="0"/>
-              <a:t>Wrote an </a:t>
-            </a:r>
-            <a:r>
-              <a:rPr lang="en-US" sz="2400" dirty="0" smtClean="0"/>
-              <a:t>android app in Java and a webserver in Java Spring</a:t>
+              <a:t>Wrote an android app in Java and a webserver in Java Spring</a:t>
             </a:r>
             <a:endParaRPr lang="en-US" sz="2400" dirty="0"/>
           </a:p>
@@ -8432,13 +8375,8 @@
             </a:pPr>
             <a:r>
               <a:rPr lang="en-US" sz="2400" dirty="0" smtClean="0"/>
-              <a:t>&gt; get JSON object and then use this object when using REST </a:t>
-            </a:r>
-            <a:r>
-              <a:rPr lang="en-US" sz="2400" dirty="0" smtClean="0"/>
-              <a:t>PUT call</a:t>
-            </a:r>
-            <a:endParaRPr lang="en-US" sz="2400" dirty="0" smtClean="0"/>
+              <a:t>&gt; get JSON object and then use this object when using REST PUT call</a:t>
+            </a:r>
           </a:p>
           <a:p>
             <a:pPr marL="342900" lvl="0" indent="-342900" defTabSz="914400"/>

</xml_diff>